<commit_message>
Exercice LinqLicornes : update après formation
</commit_message>
<xml_diff>
--- a/LinqLicornes/Formation Linq.pptx
+++ b/LinqLicornes/Formation Linq.pptx
@@ -210,7 +210,7 @@
           <a:p>
             <a:fld id="{5068D9E7-2F10-4581-B78C-9DD946E36143}" type="datetimeFigureOut">
               <a:rPr lang="fr-FR" smtClean="0"/>
-              <a:t>16/11/2020</a:t>
+              <a:t>12/01/2021</a:t>
             </a:fld>
             <a:endParaRPr lang="fr-FR"/>
           </a:p>
@@ -529,6 +529,47 @@
                 <a:effectLst/>
                 <a:latin typeface="Segoe UI" panose="020B0502040204020203" pitchFamily="34" charset="0"/>
               </a:rPr>
+              <a:t>Faire démo live :</a:t>
+            </a:r>
+          </a:p>
+          <a:p>
+            <a:r>
+              <a:rPr lang="fr-FR" b="0" i="0" u="none" dirty="0">
+                <a:solidFill>
+                  <a:srgbClr val="171717"/>
+                </a:solidFill>
+                <a:effectLst/>
+                <a:latin typeface="Segoe UI" panose="020B0502040204020203" pitchFamily="34" charset="0"/>
+              </a:rPr>
+              <a:t>C.F. </a:t>
+            </a:r>
+            <a:r>
+              <a:rPr lang="fr-FR" b="0" i="0" u="none">
+                <a:solidFill>
+                  <a:srgbClr val="171717"/>
+                </a:solidFill>
+                <a:effectLst/>
+                <a:latin typeface="Segoe UI" panose="020B0502040204020203" pitchFamily="34" charset="0"/>
+              </a:rPr>
+              <a:t>ci dessous</a:t>
+            </a:r>
+            <a:endParaRPr lang="fr-FR" b="0" i="0" u="none" dirty="0">
+              <a:solidFill>
+                <a:srgbClr val="171717"/>
+              </a:solidFill>
+              <a:effectLst/>
+              <a:latin typeface="Segoe UI" panose="020B0502040204020203" pitchFamily="34" charset="0"/>
+            </a:endParaRPr>
+          </a:p>
+          <a:p>
+            <a:r>
+              <a:rPr lang="fr-FR" b="0" i="0" u="sng" dirty="0">
+                <a:solidFill>
+                  <a:srgbClr val="171717"/>
+                </a:solidFill>
+                <a:effectLst/>
+                <a:latin typeface="Segoe UI" panose="020B0502040204020203" pitchFamily="34" charset="0"/>
+              </a:rPr>
               <a:t>Select :</a:t>
             </a:r>
           </a:p>
@@ -651,6 +692,789 @@
               </a:rPr>
               <a:t> et aplatit les séquences résultantes en une seule séquence.</a:t>
             </a:r>
+          </a:p>
+          <a:p>
+            <a:endParaRPr lang="fr-FR" b="0" i="0" dirty="0">
+              <a:solidFill>
+                <a:srgbClr val="171717"/>
+              </a:solidFill>
+              <a:effectLst/>
+              <a:latin typeface="Segoe UI" panose="020B0502040204020203" pitchFamily="34" charset="0"/>
+            </a:endParaRPr>
+          </a:p>
+          <a:p>
+            <a:r>
+              <a:rPr lang="fr-FR" b="0" i="0" dirty="0">
+                <a:solidFill>
+                  <a:srgbClr val="171717"/>
+                </a:solidFill>
+                <a:effectLst/>
+                <a:latin typeface="Segoe UI" panose="020B0502040204020203" pitchFamily="34" charset="0"/>
+              </a:rPr>
+              <a:t>Code pour la démo live :</a:t>
+            </a:r>
+          </a:p>
+          <a:p>
+            <a:r>
+              <a:rPr lang="fr-FR" b="0" i="0" u="none" dirty="0">
+                <a:solidFill>
+                  <a:srgbClr val="171717"/>
+                </a:solidFill>
+                <a:effectLst/>
+                <a:latin typeface="Segoe UI" panose="020B0502040204020203" pitchFamily="34" charset="0"/>
+              </a:rPr>
+              <a:t> string[] </a:t>
+            </a:r>
+            <a:r>
+              <a:rPr lang="fr-FR" b="0" i="0" u="none" dirty="0" err="1">
+                <a:solidFill>
+                  <a:srgbClr val="171717"/>
+                </a:solidFill>
+                <a:effectLst/>
+                <a:latin typeface="Segoe UI" panose="020B0502040204020203" pitchFamily="34" charset="0"/>
+              </a:rPr>
+              <a:t>colors</a:t>
+            </a:r>
+            <a:r>
+              <a:rPr lang="fr-FR" b="0" i="0" u="none" dirty="0">
+                <a:solidFill>
+                  <a:srgbClr val="171717"/>
+                </a:solidFill>
+                <a:effectLst/>
+                <a:latin typeface="Segoe UI" panose="020B0502040204020203" pitchFamily="34" charset="0"/>
+              </a:rPr>
+              <a:t> = { "green", "</a:t>
+            </a:r>
+            <a:r>
+              <a:rPr lang="fr-FR" b="0" i="0" u="none" dirty="0" err="1">
+                <a:solidFill>
+                  <a:srgbClr val="171717"/>
+                </a:solidFill>
+                <a:effectLst/>
+                <a:latin typeface="Segoe UI" panose="020B0502040204020203" pitchFamily="34" charset="0"/>
+              </a:rPr>
+              <a:t>brown</a:t>
+            </a:r>
+            <a:r>
+              <a:rPr lang="fr-FR" b="0" i="0" u="none" dirty="0">
+                <a:solidFill>
+                  <a:srgbClr val="171717"/>
+                </a:solidFill>
+                <a:effectLst/>
+                <a:latin typeface="Segoe UI" panose="020B0502040204020203" pitchFamily="34" charset="0"/>
+              </a:rPr>
+              <a:t>", "</a:t>
+            </a:r>
+            <a:r>
+              <a:rPr lang="fr-FR" b="0" i="0" u="none" dirty="0" err="1">
+                <a:solidFill>
+                  <a:srgbClr val="171717"/>
+                </a:solidFill>
+                <a:effectLst/>
+                <a:latin typeface="Segoe UI" panose="020B0502040204020203" pitchFamily="34" charset="0"/>
+              </a:rPr>
+              <a:t>blue</a:t>
+            </a:r>
+            <a:r>
+              <a:rPr lang="fr-FR" b="0" i="0" u="none" dirty="0">
+                <a:solidFill>
+                  <a:srgbClr val="171717"/>
+                </a:solidFill>
+                <a:effectLst/>
+                <a:latin typeface="Segoe UI" panose="020B0502040204020203" pitchFamily="34" charset="0"/>
+              </a:rPr>
+              <a:t>", "</a:t>
+            </a:r>
+            <a:r>
+              <a:rPr lang="fr-FR" b="0" i="0" u="none" dirty="0" err="1">
+                <a:solidFill>
+                  <a:srgbClr val="171717"/>
+                </a:solidFill>
+                <a:effectLst/>
+                <a:latin typeface="Segoe UI" panose="020B0502040204020203" pitchFamily="34" charset="0"/>
+              </a:rPr>
+              <a:t>red</a:t>
+            </a:r>
+            <a:r>
+              <a:rPr lang="fr-FR" b="0" i="0" u="none" dirty="0">
+                <a:solidFill>
+                  <a:srgbClr val="171717"/>
+                </a:solidFill>
+                <a:effectLst/>
+                <a:latin typeface="Segoe UI" panose="020B0502040204020203" pitchFamily="34" charset="0"/>
+              </a:rPr>
+              <a:t>" };</a:t>
+            </a:r>
+          </a:p>
+          <a:p>
+            <a:r>
+              <a:rPr lang="fr-FR" b="0" i="0" u="none" dirty="0">
+                <a:solidFill>
+                  <a:srgbClr val="171717"/>
+                </a:solidFill>
+                <a:effectLst/>
+                <a:latin typeface="Segoe UI" panose="020B0502040204020203" pitchFamily="34" charset="0"/>
+              </a:rPr>
+              <a:t>            </a:t>
+            </a:r>
+          </a:p>
+          <a:p>
+            <a:r>
+              <a:rPr lang="fr-FR" b="0" i="0" u="none" dirty="0">
+                <a:solidFill>
+                  <a:srgbClr val="171717"/>
+                </a:solidFill>
+                <a:effectLst/>
+                <a:latin typeface="Segoe UI" panose="020B0502040204020203" pitchFamily="34" charset="0"/>
+              </a:rPr>
+              <a:t>            var </a:t>
+            </a:r>
+            <a:r>
+              <a:rPr lang="fr-FR" b="0" i="0" u="none" dirty="0" err="1">
+                <a:solidFill>
+                  <a:srgbClr val="171717"/>
+                </a:solidFill>
+                <a:effectLst/>
+                <a:latin typeface="Segoe UI" panose="020B0502040204020203" pitchFamily="34" charset="0"/>
+              </a:rPr>
+              <a:t>query</a:t>
+            </a:r>
+            <a:r>
+              <a:rPr lang="fr-FR" b="0" i="0" u="none" dirty="0">
+                <a:solidFill>
+                  <a:srgbClr val="171717"/>
+                </a:solidFill>
+                <a:effectLst/>
+                <a:latin typeface="Segoe UI" panose="020B0502040204020203" pitchFamily="34" charset="0"/>
+              </a:rPr>
+              <a:t> = </a:t>
+            </a:r>
+            <a:r>
+              <a:rPr lang="fr-FR" b="0" i="0" u="none" dirty="0" err="1">
+                <a:solidFill>
+                  <a:srgbClr val="171717"/>
+                </a:solidFill>
+                <a:effectLst/>
+                <a:latin typeface="Segoe UI" panose="020B0502040204020203" pitchFamily="34" charset="0"/>
+              </a:rPr>
+              <a:t>from</a:t>
+            </a:r>
+            <a:r>
+              <a:rPr lang="fr-FR" b="0" i="0" u="none" dirty="0">
+                <a:solidFill>
+                  <a:srgbClr val="171717"/>
+                </a:solidFill>
+                <a:effectLst/>
+                <a:latin typeface="Segoe UI" panose="020B0502040204020203" pitchFamily="34" charset="0"/>
+              </a:rPr>
+              <a:t> c in </a:t>
+            </a:r>
+            <a:r>
+              <a:rPr lang="fr-FR" b="0" i="0" u="none" dirty="0" err="1">
+                <a:solidFill>
+                  <a:srgbClr val="171717"/>
+                </a:solidFill>
+                <a:effectLst/>
+                <a:latin typeface="Segoe UI" panose="020B0502040204020203" pitchFamily="34" charset="0"/>
+              </a:rPr>
+              <a:t>colors</a:t>
+            </a:r>
+            <a:endParaRPr lang="fr-FR" b="0" i="0" u="none" dirty="0">
+              <a:solidFill>
+                <a:srgbClr val="171717"/>
+              </a:solidFill>
+              <a:effectLst/>
+              <a:latin typeface="Segoe UI" panose="020B0502040204020203" pitchFamily="34" charset="0"/>
+            </a:endParaRPr>
+          </a:p>
+          <a:p>
+            <a:r>
+              <a:rPr lang="fr-FR" b="0" i="0" u="none" dirty="0">
+                <a:solidFill>
+                  <a:srgbClr val="171717"/>
+                </a:solidFill>
+                <a:effectLst/>
+                <a:latin typeface="Segoe UI" panose="020B0502040204020203" pitchFamily="34" charset="0"/>
+              </a:rPr>
+              <a:t>                        </a:t>
+            </a:r>
+            <a:r>
+              <a:rPr lang="fr-FR" b="0" i="0" u="none" dirty="0" err="1">
+                <a:solidFill>
+                  <a:srgbClr val="171717"/>
+                </a:solidFill>
+                <a:effectLst/>
+                <a:latin typeface="Segoe UI" panose="020B0502040204020203" pitchFamily="34" charset="0"/>
+              </a:rPr>
+              <a:t>where</a:t>
+            </a:r>
+            <a:r>
+              <a:rPr lang="fr-FR" b="0" i="0" u="none" dirty="0">
+                <a:solidFill>
+                  <a:srgbClr val="171717"/>
+                </a:solidFill>
+                <a:effectLst/>
+                <a:latin typeface="Segoe UI" panose="020B0502040204020203" pitchFamily="34" charset="0"/>
+              </a:rPr>
+              <a:t> </a:t>
+            </a:r>
+            <a:r>
+              <a:rPr lang="fr-FR" b="0" i="0" u="none" dirty="0" err="1">
+                <a:solidFill>
+                  <a:srgbClr val="171717"/>
+                </a:solidFill>
+                <a:effectLst/>
+                <a:latin typeface="Segoe UI" panose="020B0502040204020203" pitchFamily="34" charset="0"/>
+              </a:rPr>
+              <a:t>c.Length</a:t>
+            </a:r>
+            <a:r>
+              <a:rPr lang="fr-FR" b="0" i="0" u="none" dirty="0">
+                <a:solidFill>
+                  <a:srgbClr val="171717"/>
+                </a:solidFill>
+                <a:effectLst/>
+                <a:latin typeface="Segoe UI" panose="020B0502040204020203" pitchFamily="34" charset="0"/>
+              </a:rPr>
+              <a:t> &gt; 3</a:t>
+            </a:r>
+          </a:p>
+          <a:p>
+            <a:r>
+              <a:rPr lang="fr-FR" b="0" i="0" u="none" dirty="0">
+                <a:solidFill>
+                  <a:srgbClr val="171717"/>
+                </a:solidFill>
+                <a:effectLst/>
+                <a:latin typeface="Segoe UI" panose="020B0502040204020203" pitchFamily="34" charset="0"/>
+              </a:rPr>
+              <a:t>                        </a:t>
+            </a:r>
+            <a:r>
+              <a:rPr lang="fr-FR" b="0" i="0" u="none" dirty="0" err="1">
+                <a:solidFill>
+                  <a:srgbClr val="171717"/>
+                </a:solidFill>
+                <a:effectLst/>
+                <a:latin typeface="Segoe UI" panose="020B0502040204020203" pitchFamily="34" charset="0"/>
+              </a:rPr>
+              <a:t>orderby</a:t>
+            </a:r>
+            <a:r>
+              <a:rPr lang="fr-FR" b="0" i="0" u="none" dirty="0">
+                <a:solidFill>
+                  <a:srgbClr val="171717"/>
+                </a:solidFill>
+                <a:effectLst/>
+                <a:latin typeface="Segoe UI" panose="020B0502040204020203" pitchFamily="34" charset="0"/>
+              </a:rPr>
+              <a:t> </a:t>
+            </a:r>
+            <a:r>
+              <a:rPr lang="fr-FR" b="0" i="0" u="none" dirty="0" err="1">
+                <a:solidFill>
+                  <a:srgbClr val="171717"/>
+                </a:solidFill>
+                <a:effectLst/>
+                <a:latin typeface="Segoe UI" panose="020B0502040204020203" pitchFamily="34" charset="0"/>
+              </a:rPr>
+              <a:t>c.Length</a:t>
+            </a:r>
+            <a:endParaRPr lang="fr-FR" b="0" i="0" u="none" dirty="0">
+              <a:solidFill>
+                <a:srgbClr val="171717"/>
+              </a:solidFill>
+              <a:effectLst/>
+              <a:latin typeface="Segoe UI" panose="020B0502040204020203" pitchFamily="34" charset="0"/>
+            </a:endParaRPr>
+          </a:p>
+          <a:p>
+            <a:r>
+              <a:rPr lang="fr-FR" b="0" i="0" u="none" dirty="0">
+                <a:solidFill>
+                  <a:srgbClr val="171717"/>
+                </a:solidFill>
+                <a:effectLst/>
+                <a:latin typeface="Segoe UI" panose="020B0502040204020203" pitchFamily="34" charset="0"/>
+              </a:rPr>
+              <a:t>                        select c;</a:t>
+            </a:r>
+          </a:p>
+          <a:p>
+            <a:endParaRPr lang="fr-FR" b="0" i="0" u="none" dirty="0">
+              <a:solidFill>
+                <a:srgbClr val="171717"/>
+              </a:solidFill>
+              <a:effectLst/>
+              <a:latin typeface="Segoe UI" panose="020B0502040204020203" pitchFamily="34" charset="0"/>
+            </a:endParaRPr>
+          </a:p>
+          <a:p>
+            <a:r>
+              <a:rPr lang="fr-FR" b="0" i="0" u="none" dirty="0">
+                <a:solidFill>
+                  <a:srgbClr val="171717"/>
+                </a:solidFill>
+                <a:effectLst/>
+                <a:latin typeface="Segoe UI" panose="020B0502040204020203" pitchFamily="34" charset="0"/>
+              </a:rPr>
+              <a:t>            //https://docs.microsoft.com/fr-fr/dotnet/csharp/linq/perform-inner-joins</a:t>
+            </a:r>
+          </a:p>
+          <a:p>
+            <a:endParaRPr lang="fr-FR" b="0" i="0" u="none" dirty="0">
+              <a:solidFill>
+                <a:srgbClr val="171717"/>
+              </a:solidFill>
+              <a:effectLst/>
+              <a:latin typeface="Segoe UI" panose="020B0502040204020203" pitchFamily="34" charset="0"/>
+            </a:endParaRPr>
+          </a:p>
+          <a:p>
+            <a:endParaRPr lang="fr-FR" b="0" i="0" u="none" dirty="0">
+              <a:solidFill>
+                <a:srgbClr val="171717"/>
+              </a:solidFill>
+              <a:effectLst/>
+              <a:latin typeface="Segoe UI" panose="020B0502040204020203" pitchFamily="34" charset="0"/>
+            </a:endParaRPr>
+          </a:p>
+          <a:p>
+            <a:r>
+              <a:rPr lang="fr-FR" b="0" i="0" u="none" dirty="0">
+                <a:solidFill>
+                  <a:srgbClr val="171717"/>
+                </a:solidFill>
+                <a:effectLst/>
+                <a:latin typeface="Segoe UI" panose="020B0502040204020203" pitchFamily="34" charset="0"/>
+              </a:rPr>
+              <a:t>            var </a:t>
+            </a:r>
+            <a:r>
+              <a:rPr lang="fr-FR" b="0" i="0" u="none" dirty="0" err="1">
+                <a:solidFill>
+                  <a:srgbClr val="171717"/>
+                </a:solidFill>
+                <a:effectLst/>
+                <a:latin typeface="Segoe UI" panose="020B0502040204020203" pitchFamily="34" charset="0"/>
+              </a:rPr>
+              <a:t>query</a:t>
+            </a:r>
+            <a:r>
+              <a:rPr lang="fr-FR" b="0" i="0" u="none" dirty="0">
+                <a:solidFill>
+                  <a:srgbClr val="171717"/>
+                </a:solidFill>
+                <a:effectLst/>
+                <a:latin typeface="Segoe UI" panose="020B0502040204020203" pitchFamily="34" charset="0"/>
+              </a:rPr>
+              <a:t> = </a:t>
+            </a:r>
+            <a:r>
+              <a:rPr lang="fr-FR" b="0" i="0" u="none" dirty="0" err="1">
+                <a:solidFill>
+                  <a:srgbClr val="171717"/>
+                </a:solidFill>
+                <a:effectLst/>
+                <a:latin typeface="Segoe UI" panose="020B0502040204020203" pitchFamily="34" charset="0"/>
+              </a:rPr>
+              <a:t>from</a:t>
+            </a:r>
+            <a:r>
+              <a:rPr lang="fr-FR" b="0" i="0" u="none" dirty="0">
+                <a:solidFill>
+                  <a:srgbClr val="171717"/>
+                </a:solidFill>
+                <a:effectLst/>
+                <a:latin typeface="Segoe UI" panose="020B0502040204020203" pitchFamily="34" charset="0"/>
+              </a:rPr>
+              <a:t> </a:t>
+            </a:r>
+            <a:r>
+              <a:rPr lang="fr-FR" b="0" i="0" u="none" dirty="0" err="1">
+                <a:solidFill>
+                  <a:srgbClr val="171717"/>
+                </a:solidFill>
+                <a:effectLst/>
+                <a:latin typeface="Segoe UI" panose="020B0502040204020203" pitchFamily="34" charset="0"/>
+              </a:rPr>
+              <a:t>person</a:t>
+            </a:r>
+            <a:r>
+              <a:rPr lang="fr-FR" b="0" i="0" u="none" dirty="0">
+                <a:solidFill>
+                  <a:srgbClr val="171717"/>
+                </a:solidFill>
+                <a:effectLst/>
+                <a:latin typeface="Segoe UI" panose="020B0502040204020203" pitchFamily="34" charset="0"/>
+              </a:rPr>
+              <a:t> in people</a:t>
+            </a:r>
+          </a:p>
+          <a:p>
+            <a:r>
+              <a:rPr lang="fr-FR" b="0" i="0" u="none" dirty="0">
+                <a:solidFill>
+                  <a:srgbClr val="171717"/>
+                </a:solidFill>
+                <a:effectLst/>
+                <a:latin typeface="Segoe UI" panose="020B0502040204020203" pitchFamily="34" charset="0"/>
+              </a:rPr>
+              <a:t>                        </a:t>
+            </a:r>
+            <a:r>
+              <a:rPr lang="fr-FR" b="0" i="0" u="none" dirty="0" err="1">
+                <a:solidFill>
+                  <a:srgbClr val="171717"/>
+                </a:solidFill>
+                <a:effectLst/>
+                <a:latin typeface="Segoe UI" panose="020B0502040204020203" pitchFamily="34" charset="0"/>
+              </a:rPr>
+              <a:t>join</a:t>
+            </a:r>
+            <a:r>
+              <a:rPr lang="fr-FR" b="0" i="0" u="none" dirty="0">
+                <a:solidFill>
+                  <a:srgbClr val="171717"/>
+                </a:solidFill>
+                <a:effectLst/>
+                <a:latin typeface="Segoe UI" panose="020B0502040204020203" pitchFamily="34" charset="0"/>
+              </a:rPr>
+              <a:t> pet in pets on </a:t>
+            </a:r>
+            <a:r>
+              <a:rPr lang="fr-FR" b="0" i="0" u="none" dirty="0" err="1">
+                <a:solidFill>
+                  <a:srgbClr val="171717"/>
+                </a:solidFill>
+                <a:effectLst/>
+                <a:latin typeface="Segoe UI" panose="020B0502040204020203" pitchFamily="34" charset="0"/>
+              </a:rPr>
+              <a:t>person</a:t>
+            </a:r>
+            <a:r>
+              <a:rPr lang="fr-FR" b="0" i="0" u="none" dirty="0">
+                <a:solidFill>
+                  <a:srgbClr val="171717"/>
+                </a:solidFill>
+                <a:effectLst/>
+                <a:latin typeface="Segoe UI" panose="020B0502040204020203" pitchFamily="34" charset="0"/>
+              </a:rPr>
+              <a:t> </a:t>
+            </a:r>
+            <a:r>
+              <a:rPr lang="fr-FR" b="0" i="0" u="none" dirty="0" err="1">
+                <a:solidFill>
+                  <a:srgbClr val="171717"/>
+                </a:solidFill>
+                <a:effectLst/>
+                <a:latin typeface="Segoe UI" panose="020B0502040204020203" pitchFamily="34" charset="0"/>
+              </a:rPr>
+              <a:t>equals</a:t>
+            </a:r>
+            <a:r>
+              <a:rPr lang="fr-FR" b="0" i="0" u="none" dirty="0">
+                <a:solidFill>
+                  <a:srgbClr val="171717"/>
+                </a:solidFill>
+                <a:effectLst/>
+                <a:latin typeface="Segoe UI" panose="020B0502040204020203" pitchFamily="34" charset="0"/>
+              </a:rPr>
+              <a:t> </a:t>
+            </a:r>
+            <a:r>
+              <a:rPr lang="fr-FR" b="0" i="0" u="none" dirty="0" err="1">
+                <a:solidFill>
+                  <a:srgbClr val="171717"/>
+                </a:solidFill>
+                <a:effectLst/>
+                <a:latin typeface="Segoe UI" panose="020B0502040204020203" pitchFamily="34" charset="0"/>
+              </a:rPr>
+              <a:t>pet.Owner</a:t>
+            </a:r>
+            <a:endParaRPr lang="fr-FR" b="0" i="0" u="none" dirty="0">
+              <a:solidFill>
+                <a:srgbClr val="171717"/>
+              </a:solidFill>
+              <a:effectLst/>
+              <a:latin typeface="Segoe UI" panose="020B0502040204020203" pitchFamily="34" charset="0"/>
+            </a:endParaRPr>
+          </a:p>
+          <a:p>
+            <a:r>
+              <a:rPr lang="fr-FR" b="0" i="0" u="none" dirty="0">
+                <a:solidFill>
+                  <a:srgbClr val="171717"/>
+                </a:solidFill>
+                <a:effectLst/>
+                <a:latin typeface="Segoe UI" panose="020B0502040204020203" pitchFamily="34" charset="0"/>
+              </a:rPr>
+              <a:t>                        select new { </a:t>
+            </a:r>
+            <a:r>
+              <a:rPr lang="fr-FR" b="0" i="0" u="none" dirty="0" err="1">
+                <a:solidFill>
+                  <a:srgbClr val="171717"/>
+                </a:solidFill>
+                <a:effectLst/>
+                <a:latin typeface="Segoe UI" panose="020B0502040204020203" pitchFamily="34" charset="0"/>
+              </a:rPr>
+              <a:t>OwnerName</a:t>
+            </a:r>
+            <a:r>
+              <a:rPr lang="fr-FR" b="0" i="0" u="none" dirty="0">
+                <a:solidFill>
+                  <a:srgbClr val="171717"/>
+                </a:solidFill>
+                <a:effectLst/>
+                <a:latin typeface="Segoe UI" panose="020B0502040204020203" pitchFamily="34" charset="0"/>
+              </a:rPr>
+              <a:t> = </a:t>
+            </a:r>
+            <a:r>
+              <a:rPr lang="fr-FR" b="0" i="0" u="none" dirty="0" err="1">
+                <a:solidFill>
+                  <a:srgbClr val="171717"/>
+                </a:solidFill>
+                <a:effectLst/>
+                <a:latin typeface="Segoe UI" panose="020B0502040204020203" pitchFamily="34" charset="0"/>
+              </a:rPr>
+              <a:t>person.FirstName</a:t>
+            </a:r>
+            <a:r>
+              <a:rPr lang="fr-FR" b="0" i="0" u="none" dirty="0">
+                <a:solidFill>
+                  <a:srgbClr val="171717"/>
+                </a:solidFill>
+                <a:effectLst/>
+                <a:latin typeface="Segoe UI" panose="020B0502040204020203" pitchFamily="34" charset="0"/>
+              </a:rPr>
+              <a:t>, </a:t>
+            </a:r>
+            <a:r>
+              <a:rPr lang="fr-FR" b="0" i="0" u="none" dirty="0" err="1">
+                <a:solidFill>
+                  <a:srgbClr val="171717"/>
+                </a:solidFill>
+                <a:effectLst/>
+                <a:latin typeface="Segoe UI" panose="020B0502040204020203" pitchFamily="34" charset="0"/>
+              </a:rPr>
+              <a:t>PetName</a:t>
+            </a:r>
+            <a:r>
+              <a:rPr lang="fr-FR" b="0" i="0" u="none" dirty="0">
+                <a:solidFill>
+                  <a:srgbClr val="171717"/>
+                </a:solidFill>
+                <a:effectLst/>
+                <a:latin typeface="Segoe UI" panose="020B0502040204020203" pitchFamily="34" charset="0"/>
+              </a:rPr>
+              <a:t> = </a:t>
+            </a:r>
+            <a:r>
+              <a:rPr lang="fr-FR" b="0" i="0" u="none" dirty="0" err="1">
+                <a:solidFill>
+                  <a:srgbClr val="171717"/>
+                </a:solidFill>
+                <a:effectLst/>
+                <a:latin typeface="Segoe UI" panose="020B0502040204020203" pitchFamily="34" charset="0"/>
+              </a:rPr>
+              <a:t>pet.Name</a:t>
+            </a:r>
+            <a:r>
+              <a:rPr lang="fr-FR" b="0" i="0" u="none" dirty="0">
+                <a:solidFill>
+                  <a:srgbClr val="171717"/>
+                </a:solidFill>
+                <a:effectLst/>
+                <a:latin typeface="Segoe UI" panose="020B0502040204020203" pitchFamily="34" charset="0"/>
+              </a:rPr>
+              <a:t> };</a:t>
+            </a:r>
+          </a:p>
+          <a:p>
+            <a:endParaRPr lang="fr-FR" b="0" i="0" u="none" dirty="0">
+              <a:solidFill>
+                <a:srgbClr val="171717"/>
+              </a:solidFill>
+              <a:effectLst/>
+              <a:latin typeface="Segoe UI" panose="020B0502040204020203" pitchFamily="34" charset="0"/>
+            </a:endParaRPr>
+          </a:p>
+          <a:p>
+            <a:r>
+              <a:rPr lang="fr-FR" b="0" i="0" u="none" dirty="0">
+                <a:solidFill>
+                  <a:srgbClr val="171717"/>
+                </a:solidFill>
+                <a:effectLst/>
+                <a:latin typeface="Segoe UI" panose="020B0502040204020203" pitchFamily="34" charset="0"/>
+              </a:rPr>
+              <a:t>            //var </a:t>
+            </a:r>
+          </a:p>
+          <a:p>
+            <a:r>
+              <a:rPr lang="fr-FR" b="0" i="0" u="none" dirty="0">
+                <a:solidFill>
+                  <a:srgbClr val="171717"/>
+                </a:solidFill>
+                <a:effectLst/>
+                <a:latin typeface="Segoe UI" panose="020B0502040204020203" pitchFamily="34" charset="0"/>
+              </a:rPr>
+              <a:t>                </a:t>
+            </a:r>
+            <a:r>
+              <a:rPr lang="fr-FR" b="0" i="0" u="none" dirty="0" err="1">
+                <a:solidFill>
+                  <a:srgbClr val="171717"/>
+                </a:solidFill>
+                <a:effectLst/>
+                <a:latin typeface="Segoe UI" panose="020B0502040204020203" pitchFamily="34" charset="0"/>
+              </a:rPr>
+              <a:t>query</a:t>
+            </a:r>
+            <a:r>
+              <a:rPr lang="fr-FR" b="0" i="0" u="none" dirty="0">
+                <a:solidFill>
+                  <a:srgbClr val="171717"/>
+                </a:solidFill>
+                <a:effectLst/>
+                <a:latin typeface="Segoe UI" panose="020B0502040204020203" pitchFamily="34" charset="0"/>
+              </a:rPr>
+              <a:t> = </a:t>
+            </a:r>
+            <a:r>
+              <a:rPr lang="fr-FR" b="0" i="0" u="none" dirty="0" err="1">
+                <a:solidFill>
+                  <a:srgbClr val="171717"/>
+                </a:solidFill>
+                <a:effectLst/>
+                <a:latin typeface="Segoe UI" panose="020B0502040204020203" pitchFamily="34" charset="0"/>
+              </a:rPr>
+              <a:t>people.Join</a:t>
+            </a:r>
+            <a:r>
+              <a:rPr lang="fr-FR" b="0" i="0" u="none" dirty="0">
+                <a:solidFill>
+                  <a:srgbClr val="171717"/>
+                </a:solidFill>
+                <a:effectLst/>
+                <a:latin typeface="Segoe UI" panose="020B0502040204020203" pitchFamily="34" charset="0"/>
+              </a:rPr>
+              <a:t>(pets, pers =&gt; pers, pet =&gt; </a:t>
+            </a:r>
+            <a:r>
+              <a:rPr lang="fr-FR" b="0" i="0" u="none" dirty="0" err="1">
+                <a:solidFill>
+                  <a:srgbClr val="171717"/>
+                </a:solidFill>
+                <a:effectLst/>
+                <a:latin typeface="Segoe UI" panose="020B0502040204020203" pitchFamily="34" charset="0"/>
+              </a:rPr>
+              <a:t>pet.Owner</a:t>
+            </a:r>
+            <a:r>
+              <a:rPr lang="fr-FR" b="0" i="0" u="none" dirty="0">
+                <a:solidFill>
+                  <a:srgbClr val="171717"/>
+                </a:solidFill>
+                <a:effectLst/>
+                <a:latin typeface="Segoe UI" panose="020B0502040204020203" pitchFamily="34" charset="0"/>
+              </a:rPr>
+              <a:t>, (pers, pet) =&gt; new { </a:t>
+            </a:r>
+            <a:r>
+              <a:rPr lang="fr-FR" b="0" i="0" u="none" dirty="0" err="1">
+                <a:solidFill>
+                  <a:srgbClr val="171717"/>
+                </a:solidFill>
+                <a:effectLst/>
+                <a:latin typeface="Segoe UI" panose="020B0502040204020203" pitchFamily="34" charset="0"/>
+              </a:rPr>
+              <a:t>OwnerName</a:t>
+            </a:r>
+            <a:r>
+              <a:rPr lang="fr-FR" b="0" i="0" u="none" dirty="0">
+                <a:solidFill>
+                  <a:srgbClr val="171717"/>
+                </a:solidFill>
+                <a:effectLst/>
+                <a:latin typeface="Segoe UI" panose="020B0502040204020203" pitchFamily="34" charset="0"/>
+              </a:rPr>
+              <a:t> = </a:t>
+            </a:r>
+            <a:r>
+              <a:rPr lang="fr-FR" b="0" i="0" u="none" dirty="0" err="1">
+                <a:solidFill>
+                  <a:srgbClr val="171717"/>
+                </a:solidFill>
+                <a:effectLst/>
+                <a:latin typeface="Segoe UI" panose="020B0502040204020203" pitchFamily="34" charset="0"/>
+              </a:rPr>
+              <a:t>pers.FirstName</a:t>
+            </a:r>
+            <a:r>
+              <a:rPr lang="fr-FR" b="0" i="0" u="none" dirty="0">
+                <a:solidFill>
+                  <a:srgbClr val="171717"/>
+                </a:solidFill>
+                <a:effectLst/>
+                <a:latin typeface="Segoe UI" panose="020B0502040204020203" pitchFamily="34" charset="0"/>
+              </a:rPr>
+              <a:t>, </a:t>
+            </a:r>
+            <a:r>
+              <a:rPr lang="fr-FR" b="0" i="0" u="none" dirty="0" err="1">
+                <a:solidFill>
+                  <a:srgbClr val="171717"/>
+                </a:solidFill>
+                <a:effectLst/>
+                <a:latin typeface="Segoe UI" panose="020B0502040204020203" pitchFamily="34" charset="0"/>
+              </a:rPr>
+              <a:t>PetName</a:t>
+            </a:r>
+            <a:r>
+              <a:rPr lang="fr-FR" b="0" i="0" u="none" dirty="0">
+                <a:solidFill>
+                  <a:srgbClr val="171717"/>
+                </a:solidFill>
+                <a:effectLst/>
+                <a:latin typeface="Segoe UI" panose="020B0502040204020203" pitchFamily="34" charset="0"/>
+              </a:rPr>
+              <a:t> = </a:t>
+            </a:r>
+            <a:r>
+              <a:rPr lang="fr-FR" b="0" i="0" u="none" dirty="0" err="1">
+                <a:solidFill>
+                  <a:srgbClr val="171717"/>
+                </a:solidFill>
+                <a:effectLst/>
+                <a:latin typeface="Segoe UI" panose="020B0502040204020203" pitchFamily="34" charset="0"/>
+              </a:rPr>
+              <a:t>pet.Name</a:t>
+            </a:r>
+            <a:r>
+              <a:rPr lang="fr-FR" b="0" i="0" u="none" dirty="0">
+                <a:solidFill>
+                  <a:srgbClr val="171717"/>
+                </a:solidFill>
+                <a:effectLst/>
+                <a:latin typeface="Segoe UI" panose="020B0502040204020203" pitchFamily="34" charset="0"/>
+              </a:rPr>
+              <a:t> });</a:t>
+            </a:r>
+          </a:p>
+          <a:p>
+            <a:endParaRPr lang="fr-FR" b="0" i="0" u="none" dirty="0">
+              <a:solidFill>
+                <a:srgbClr val="171717"/>
+              </a:solidFill>
+              <a:effectLst/>
+              <a:latin typeface="Segoe UI" panose="020B0502040204020203" pitchFamily="34" charset="0"/>
+            </a:endParaRPr>
+          </a:p>
+          <a:p>
             <a:endParaRPr lang="fr-FR" dirty="0"/>
           </a:p>
         </p:txBody>
@@ -2142,7 +2966,7 @@
           <a:p>
             <a:fld id="{2C7AE900-0C31-4564-B952-E72786C2C5AB}" type="datetimeFigureOut">
               <a:rPr lang="fr-FR" smtClean="0"/>
-              <a:t>16/11/2020</a:t>
+              <a:t>12/01/2021</a:t>
             </a:fld>
             <a:endParaRPr lang="fr-FR"/>
           </a:p>
@@ -3230,7 +4054,7 @@
           <a:p>
             <a:fld id="{2C7AE900-0C31-4564-B952-E72786C2C5AB}" type="datetimeFigureOut">
               <a:rPr lang="fr-FR" smtClean="0"/>
-              <a:t>16/11/2020</a:t>
+              <a:t>12/01/2021</a:t>
             </a:fld>
             <a:endParaRPr lang="fr-FR"/>
           </a:p>
@@ -4210,7 +5034,7 @@
           <a:p>
             <a:fld id="{2C7AE900-0C31-4564-B952-E72786C2C5AB}" type="datetimeFigureOut">
               <a:rPr lang="fr-FR" smtClean="0"/>
-              <a:t>16/11/2020</a:t>
+              <a:t>12/01/2021</a:t>
             </a:fld>
             <a:endParaRPr lang="fr-FR"/>
           </a:p>
@@ -5344,7 +6168,7 @@
           <a:p>
             <a:fld id="{2C7AE900-0C31-4564-B952-E72786C2C5AB}" type="datetimeFigureOut">
               <a:rPr lang="fr-FR" smtClean="0"/>
-              <a:t>16/11/2020</a:t>
+              <a:t>12/01/2021</a:t>
             </a:fld>
             <a:endParaRPr lang="fr-FR"/>
           </a:p>
@@ -6377,7 +7201,7 @@
           <a:p>
             <a:fld id="{2C7AE900-0C31-4564-B952-E72786C2C5AB}" type="datetimeFigureOut">
               <a:rPr lang="fr-FR" smtClean="0"/>
-              <a:t>16/11/2020</a:t>
+              <a:t>12/01/2021</a:t>
             </a:fld>
             <a:endParaRPr lang="fr-FR"/>
           </a:p>
@@ -7037,7 +7861,7 @@
           <a:p>
             <a:fld id="{2C7AE900-0C31-4564-B952-E72786C2C5AB}" type="datetimeFigureOut">
               <a:rPr lang="fr-FR" smtClean="0"/>
-              <a:t>16/11/2020</a:t>
+              <a:t>12/01/2021</a:t>
             </a:fld>
             <a:endParaRPr lang="fr-FR"/>
           </a:p>
@@ -7898,7 +8722,7 @@
           <a:p>
             <a:fld id="{2C7AE900-0C31-4564-B952-E72786C2C5AB}" type="datetimeFigureOut">
               <a:rPr lang="fr-FR" smtClean="0"/>
-              <a:t>16/11/2020</a:t>
+              <a:t>12/01/2021</a:t>
             </a:fld>
             <a:endParaRPr lang="fr-FR"/>
           </a:p>
@@ -8088,7 +8912,7 @@
           <a:p>
             <a:fld id="{2C7AE900-0C31-4564-B952-E72786C2C5AB}" type="datetimeFigureOut">
               <a:rPr lang="fr-FR" smtClean="0"/>
-              <a:t>16/11/2020</a:t>
+              <a:t>12/01/2021</a:t>
             </a:fld>
             <a:endParaRPr lang="fr-FR"/>
           </a:p>
@@ -9060,7 +9884,7 @@
           <a:p>
             <a:fld id="{2C7AE900-0C31-4564-B952-E72786C2C5AB}" type="datetimeFigureOut">
               <a:rPr lang="fr-FR" smtClean="0"/>
-              <a:t>16/11/2020</a:t>
+              <a:t>12/01/2021</a:t>
             </a:fld>
             <a:endParaRPr lang="fr-FR"/>
           </a:p>
@@ -9271,7 +10095,7 @@
           <a:p>
             <a:fld id="{2C7AE900-0C31-4564-B952-E72786C2C5AB}" type="datetimeFigureOut">
               <a:rPr lang="fr-FR" smtClean="0"/>
-              <a:t>16/11/2020</a:t>
+              <a:t>12/01/2021</a:t>
             </a:fld>
             <a:endParaRPr lang="fr-FR"/>
           </a:p>
@@ -10305,7 +11129,7 @@
           <a:p>
             <a:fld id="{2C7AE900-0C31-4564-B952-E72786C2C5AB}" type="datetimeFigureOut">
               <a:rPr lang="fr-FR" smtClean="0"/>
-              <a:t>16/11/2020</a:t>
+              <a:t>12/01/2021</a:t>
             </a:fld>
             <a:endParaRPr lang="fr-FR"/>
           </a:p>
@@ -10577,7 +11401,7 @@
           <a:p>
             <a:fld id="{2C7AE900-0C31-4564-B952-E72786C2C5AB}" type="datetimeFigureOut">
               <a:rPr lang="fr-FR" smtClean="0"/>
-              <a:t>16/11/2020</a:t>
+              <a:t>12/01/2021</a:t>
             </a:fld>
             <a:endParaRPr lang="fr-FR"/>
           </a:p>
@@ -10987,7 +11811,7 @@
           <a:p>
             <a:fld id="{2C7AE900-0C31-4564-B952-E72786C2C5AB}" type="datetimeFigureOut">
               <a:rPr lang="fr-FR" smtClean="0"/>
-              <a:t>16/11/2020</a:t>
+              <a:t>12/01/2021</a:t>
             </a:fld>
             <a:endParaRPr lang="fr-FR"/>
           </a:p>
@@ -11114,7 +11938,7 @@
           <a:p>
             <a:fld id="{2C7AE900-0C31-4564-B952-E72786C2C5AB}" type="datetimeFigureOut">
               <a:rPr lang="fr-FR" smtClean="0"/>
-              <a:t>16/11/2020</a:t>
+              <a:t>12/01/2021</a:t>
             </a:fld>
             <a:endParaRPr lang="fr-FR"/>
           </a:p>
@@ -11209,7 +12033,7 @@
           <a:p>
             <a:fld id="{2C7AE900-0C31-4564-B952-E72786C2C5AB}" type="datetimeFigureOut">
               <a:rPr lang="fr-FR" smtClean="0"/>
-              <a:t>16/11/2020</a:t>
+              <a:t>12/01/2021</a:t>
             </a:fld>
             <a:endParaRPr lang="fr-FR"/>
           </a:p>
@@ -12290,7 +13114,7 @@
           <a:p>
             <a:fld id="{2C7AE900-0C31-4564-B952-E72786C2C5AB}" type="datetimeFigureOut">
               <a:rPr lang="fr-FR" smtClean="0"/>
-              <a:t>16/11/2020</a:t>
+              <a:t>12/01/2021</a:t>
             </a:fld>
             <a:endParaRPr lang="fr-FR"/>
           </a:p>
@@ -13398,7 +14222,7 @@
           <a:p>
             <a:fld id="{2C7AE900-0C31-4564-B952-E72786C2C5AB}" type="datetimeFigureOut">
               <a:rPr lang="fr-FR" smtClean="0"/>
-              <a:t>16/11/2020</a:t>
+              <a:t>12/01/2021</a:t>
             </a:fld>
             <a:endParaRPr lang="fr-FR"/>
           </a:p>
@@ -14395,7 +15219,7 @@
           <a:p>
             <a:fld id="{2C7AE900-0C31-4564-B952-E72786C2C5AB}" type="datetimeFigureOut">
               <a:rPr lang="fr-FR" smtClean="0"/>
-              <a:t>16/11/2020</a:t>
+              <a:t>12/01/2021</a:t>
             </a:fld>
             <a:endParaRPr lang="fr-FR"/>
           </a:p>
@@ -17527,21 +18351,6 @@
 </file>
 
 <file path=customXml/item1.xml><?xml version="1.0" encoding="utf-8"?>
-<p:properties xmlns:p="http://schemas.microsoft.com/office/2006/metadata/properties" xmlns:xsi="http://www.w3.org/2001/XMLSchema-instance" xmlns:pc="http://schemas.microsoft.com/office/infopath/2007/PartnerControls">
-  <documentManagement/>
-</p:properties>
-</file>
-
-<file path=customXml/item2.xml><?xml version="1.0" encoding="utf-8"?>
-<?mso-contentType ?>
-<FormTemplates xmlns="http://schemas.microsoft.com/sharepoint/v3/contenttype/forms">
-  <Display>DocumentLibraryForm</Display>
-  <Edit>DocumentLibraryForm</Edit>
-  <New>DocumentLibraryForm</New>
-</FormTemplates>
-</file>
-
-<file path=customXml/item3.xml><?xml version="1.0" encoding="utf-8"?>
 <ct:contentTypeSchema xmlns:ct="http://schemas.microsoft.com/office/2006/metadata/contentType" xmlns:ma="http://schemas.microsoft.com/office/2006/metadata/properties/metaAttributes" ct:_="" ma:_="" ma:contentTypeName="Document" ma:contentTypeID="0x010100620EBC9C8CB51340897DF0BF65C18029" ma:contentTypeVersion="7" ma:contentTypeDescription="Crée un document." ma:contentTypeScope="" ma:versionID="7cb594e6921158557d55143a037c6cad">
   <xsd:schema xmlns:xsd="http://www.w3.org/2001/XMLSchema" xmlns:xs="http://www.w3.org/2001/XMLSchema" xmlns:p="http://schemas.microsoft.com/office/2006/metadata/properties" xmlns:ns2="bf8b2bfe-b0d3-4d9f-b92a-d896553be4ce" targetNamespace="http://schemas.microsoft.com/office/2006/metadata/properties" ma:root="true" ma:fieldsID="cd164c2ce5ca0765a0fe90d70753ac23" ns2:_="">
     <xsd:import namespace="bf8b2bfe-b0d3-4d9f-b92a-d896553be4ce"/>
@@ -17705,24 +18514,22 @@
 </ct:contentTypeSchema>
 </file>
 
-<file path=customXml/itemProps1.xml><?xml version="1.0" encoding="utf-8"?>
-<ds:datastoreItem xmlns:ds="http://schemas.openxmlformats.org/officeDocument/2006/customXml" ds:itemID="{341A4E2E-6D79-4EED-A4AF-DD7ADCD17F7B}">
-  <ds:schemaRefs>
-    <ds:schemaRef ds:uri="http://schemas.microsoft.com/office/2006/metadata/properties"/>
-    <ds:schemaRef ds:uri="http://schemas.microsoft.com/office/infopath/2007/PartnerControls"/>
-  </ds:schemaRefs>
-</ds:datastoreItem>
+<file path=customXml/item2.xml><?xml version="1.0" encoding="utf-8"?>
+<?mso-contentType ?>
+<FormTemplates xmlns="http://schemas.microsoft.com/sharepoint/v3/contenttype/forms">
+  <Display>DocumentLibraryForm</Display>
+  <Edit>DocumentLibraryForm</Edit>
+  <New>DocumentLibraryForm</New>
+</FormTemplates>
 </file>
 
-<file path=customXml/itemProps2.xml><?xml version="1.0" encoding="utf-8"?>
-<ds:datastoreItem xmlns:ds="http://schemas.openxmlformats.org/officeDocument/2006/customXml" ds:itemID="{C29F9021-5D79-4D58-B297-F72754C668A5}">
-  <ds:schemaRefs>
-    <ds:schemaRef ds:uri="http://schemas.microsoft.com/sharepoint/v3/contenttype/forms"/>
-  </ds:schemaRefs>
-</ds:datastoreItem>
+<file path=customXml/item3.xml><?xml version="1.0" encoding="utf-8"?>
+<p:properties xmlns:p="http://schemas.microsoft.com/office/2006/metadata/properties" xmlns:xsi="http://www.w3.org/2001/XMLSchema-instance" xmlns:pc="http://schemas.microsoft.com/office/infopath/2007/PartnerControls">
+  <documentManagement/>
+</p:properties>
 </file>
 
-<file path=customXml/itemProps3.xml><?xml version="1.0" encoding="utf-8"?>
+<file path=customXml/itemProps1.xml><?xml version="1.0" encoding="utf-8"?>
 <ds:datastoreItem xmlns:ds="http://schemas.openxmlformats.org/officeDocument/2006/customXml" ds:itemID="{AFDD7020-DA3F-4E32-90FB-0216978A1C89}">
   <ds:schemaRefs>
     <ds:schemaRef ds:uri="http://schemas.microsoft.com/office/2006/metadata/contentType"/>
@@ -17738,4 +18545,21 @@
     <ds:schemaRef ds:uri="http://schemas.microsoft.com/internal/obd"/>
   </ds:schemaRefs>
 </ds:datastoreItem>
+</file>
+
+<file path=customXml/itemProps2.xml><?xml version="1.0" encoding="utf-8"?>
+<ds:datastoreItem xmlns:ds="http://schemas.openxmlformats.org/officeDocument/2006/customXml" ds:itemID="{C29F9021-5D79-4D58-B297-F72754C668A5}">
+  <ds:schemaRefs>
+    <ds:schemaRef ds:uri="http://schemas.microsoft.com/sharepoint/v3/contenttype/forms"/>
+  </ds:schemaRefs>
+</ds:datastoreItem>
+</file>
+
+<file path=customXml/itemProps3.xml><?xml version="1.0" encoding="utf-8"?>
+<ds:datastoreItem xmlns:ds="http://schemas.openxmlformats.org/officeDocument/2006/customXml" ds:itemID="{341A4E2E-6D79-4EED-A4AF-DD7ADCD17F7B}">
+  <ds:schemaRefs>
+    <ds:schemaRef ds:uri="http://schemas.microsoft.com/office/2006/metadata/properties"/>
+    <ds:schemaRef ds:uri="http://schemas.microsoft.com/office/infopath/2007/PartnerControls"/>
+  </ds:schemaRefs>
+</ds:datastoreItem>
 </file>
</xml_diff>